<commit_message>
actualizo graficos en presentacion
</commit_message>
<xml_diff>
--- a/Travel Insurance - Leandro Hornos.pptx
+++ b/Travel Insurance - Leandro Hornos.pptx
@@ -16649,8 +16649,8 @@
         </p:blipFill>
         <p:spPr>
           <a:xfrm>
-            <a:off x="4356200" y="1892825"/>
-            <a:ext cx="3978093" cy="2843100"/>
+            <a:off x="4094850" y="1832450"/>
+            <a:ext cx="4050130" cy="2843100"/>
           </a:xfrm>
           <a:prstGeom prst="rect">
             <a:avLst/>
@@ -16824,9 +16824,48 @@
           </a:p>
         </p:txBody>
       </p:sp>
+      <p:sp>
+        <p:nvSpPr>
+          <p:cNvPr id="351" name="Google Shape;351;p23"/>
+          <p:cNvSpPr txBox="1"/>
+          <p:nvPr>
+            <p:ph idx="1" type="body"/>
+          </p:nvPr>
+        </p:nvSpPr>
+        <p:spPr>
+          <a:xfrm>
+            <a:off x="4253350" y="2679450"/>
+            <a:ext cx="3745800" cy="1974900"/>
+          </a:xfrm>
+          <a:prstGeom prst="rect">
+            <a:avLst/>
+          </a:prstGeom>
+        </p:spPr>
+        <p:txBody>
+          <a:bodyPr anchorCtr="0" anchor="t" bIns="91425" lIns="91425" spcFirstLastPara="1" rIns="91425" wrap="square" tIns="91425">
+            <a:normAutofit/>
+          </a:bodyPr>
+          <a:lstStyle/>
+          <a:p>
+            <a:pPr indent="0" lvl="0" marL="0" rtl="0" algn="l">
+              <a:spcBef>
+                <a:spcPts val="0"/>
+              </a:spcBef>
+              <a:spcAft>
+                <a:spcPts val="1200"/>
+              </a:spcAft>
+              <a:buNone/>
+            </a:pPr>
+            <a:r>
+              <a:t/>
+            </a:r>
+            <a:endParaRPr/>
+          </a:p>
+        </p:txBody>
+      </p:sp>
       <p:pic>
         <p:nvPicPr>
-          <p:cNvPr id="351" name="Google Shape;351;p23"/>
+          <p:cNvPr id="352" name="Google Shape;352;p23"/>
           <p:cNvPicPr preferRelativeResize="0"/>
           <p:nvPr/>
         </p:nvPicPr>
@@ -16840,8 +16879,8 @@
         </p:blipFill>
         <p:spPr>
           <a:xfrm>
-            <a:off x="1302625" y="2571750"/>
-            <a:ext cx="2705455" cy="2294500"/>
+            <a:off x="909725" y="2348950"/>
+            <a:ext cx="2946671" cy="2489750"/>
           </a:xfrm>
           <a:prstGeom prst="rect">
             <a:avLst/>
@@ -16854,12 +16893,12 @@
       </p:pic>
       <p:graphicFrame>
         <p:nvGraphicFramePr>
-          <p:cNvPr id="352" name="Google Shape;352;p23"/>
+          <p:cNvPr id="353" name="Google Shape;353;p23"/>
           <p:cNvGraphicFramePr/>
           <p:nvPr/>
         </p:nvGraphicFramePr>
         <p:xfrm>
-          <a:off x="2747700" y="1266775"/>
+          <a:off x="2639988" y="1321400"/>
           <a:ext cx="3000000" cy="3000000"/>
         </p:xfrm>
         <a:graphic>
@@ -16867,14 +16906,14 @@
             <a:tbl>
               <a:tblPr>
                 <a:noFill/>
-                <a:tableStyleId>{FC53CDBA-9641-4111-BCFE-086303AC1159}</a:tableStyleId>
+                <a:tableStyleId>{926FB249-70D4-4473-B52E-7140CC5C91D0}</a:tableStyleId>
               </a:tblPr>
               <a:tblGrid>
-                <a:gridCol w="1209550"/>
-                <a:gridCol w="1198675"/>
-                <a:gridCol w="1209550"/>
-                <a:gridCol w="1209550"/>
-                <a:gridCol w="1198675"/>
+                <a:gridCol w="1068300"/>
+                <a:gridCol w="1134575"/>
+                <a:gridCol w="1257125"/>
+                <a:gridCol w="1096725"/>
+                <a:gridCol w="1137575"/>
               </a:tblGrid>
               <a:tr h="190500">
                 <a:tc>
@@ -16882,7 +16921,7 @@
                     <a:bodyPr/>
                     <a:lstStyle/>
                     <a:p>
-                      <a:pPr indent="0" lvl="0" marL="0" rtl="0" algn="l">
+                      <a:pPr indent="0" lvl="0" marL="0" rtl="0" algn="ctr">
                         <a:spcBef>
                           <a:spcPts val="0"/>
                         </a:spcBef>
@@ -16905,7 +16944,7 @@
                     <a:bodyPr/>
                     <a:lstStyle/>
                     <a:p>
-                      <a:pPr indent="0" lvl="0" marL="0" rtl="0" algn="l">
+                      <a:pPr indent="0" lvl="0" marL="0" rtl="0" algn="ctr">
                         <a:spcBef>
                           <a:spcPts val="0"/>
                         </a:spcBef>
@@ -16928,7 +16967,7 @@
                     <a:bodyPr/>
                     <a:lstStyle/>
                     <a:p>
-                      <a:pPr indent="0" lvl="0" marL="0" rtl="0" algn="l">
+                      <a:pPr indent="0" lvl="0" marL="0" rtl="0" algn="ctr">
                         <a:spcBef>
                           <a:spcPts val="0"/>
                         </a:spcBef>
@@ -16951,7 +16990,7 @@
                     <a:bodyPr/>
                     <a:lstStyle/>
                     <a:p>
-                      <a:pPr indent="0" lvl="0" marL="0" rtl="0" algn="l">
+                      <a:pPr indent="0" lvl="0" marL="0" rtl="0" algn="ctr">
                         <a:spcBef>
                           <a:spcPts val="0"/>
                         </a:spcBef>
@@ -16974,7 +17013,7 @@
                     <a:bodyPr/>
                     <a:lstStyle/>
                     <a:p>
-                      <a:pPr indent="0" lvl="0" marL="0" rtl="0" algn="l">
+                      <a:pPr indent="0" lvl="0" marL="0" rtl="0" algn="ctr">
                         <a:spcBef>
                           <a:spcPts val="0"/>
                         </a:spcBef>
@@ -16993,13 +17032,13 @@
                   <a:tcPr marT="91425" marB="91425" marR="91425" marL="91425"/>
                 </a:tc>
               </a:tr>
-              <a:tr h="190500">
+              <a:tr h="342900">
                 <a:tc>
                   <a:txBody>
                     <a:bodyPr/>
                     <a:lstStyle/>
                     <a:p>
-                      <a:pPr indent="0" lvl="0" marL="0" rtl="0" algn="l">
+                      <a:pPr indent="0" lvl="0" marL="0" rtl="0" algn="ctr">
                         <a:spcBef>
                           <a:spcPts val="0"/>
                         </a:spcBef>
@@ -17009,10 +17048,10 @@
                         <a:buNone/>
                       </a:pPr>
                       <a:r>
-                        <a:rPr lang="es" sz="1200"/>
-                        <a:t>0,808</a:t>
+                        <a:rPr lang="es" sz="1300"/>
+                        <a:t>0,807</a:t>
                       </a:r>
-                      <a:endParaRPr sz="1200"/>
+                      <a:endParaRPr sz="1300"/>
                     </a:p>
                   </a:txBody>
                   <a:tcPr marT="91425" marB="91425" marR="91425" marL="91425"/>
@@ -17022,7 +17061,7 @@
                     <a:bodyPr/>
                     <a:lstStyle/>
                     <a:p>
-                      <a:pPr indent="0" lvl="0" marL="0" rtl="0" algn="l">
+                      <a:pPr indent="0" lvl="0" marL="0" rtl="0" algn="ctr">
                         <a:spcBef>
                           <a:spcPts val="0"/>
                         </a:spcBef>
@@ -17032,10 +17071,10 @@
                         <a:buNone/>
                       </a:pPr>
                       <a:r>
-                        <a:rPr lang="es" sz="1200"/>
-                        <a:t>0,784</a:t>
+                        <a:rPr lang="es" sz="1300"/>
+                        <a:t>0,792</a:t>
                       </a:r>
-                      <a:endParaRPr sz="1200"/>
+                      <a:endParaRPr sz="1300"/>
                     </a:p>
                   </a:txBody>
                   <a:tcPr marT="91425" marB="91425" marR="91425" marL="91425"/>
@@ -17045,7 +17084,7 @@
                     <a:bodyPr/>
                     <a:lstStyle/>
                     <a:p>
-                      <a:pPr indent="0" lvl="0" marL="0" rtl="0" algn="l">
+                      <a:pPr indent="0" lvl="0" marL="0" rtl="0" algn="ctr">
                         <a:spcBef>
                           <a:spcPts val="0"/>
                         </a:spcBef>
@@ -17055,10 +17094,10 @@
                         <a:buNone/>
                       </a:pPr>
                       <a:r>
-                        <a:rPr lang="es" sz="1200"/>
-                        <a:t>0,835</a:t>
+                        <a:rPr lang="es" sz="1300"/>
+                        <a:t>0,845</a:t>
                       </a:r>
-                      <a:endParaRPr sz="1200"/>
+                      <a:endParaRPr sz="1300"/>
                     </a:p>
                   </a:txBody>
                   <a:tcPr marT="91425" marB="91425" marR="91425" marL="91425"/>
@@ -17068,7 +17107,7 @@
                     <a:bodyPr/>
                     <a:lstStyle/>
                     <a:p>
-                      <a:pPr indent="0" lvl="0" marL="0" rtl="0" algn="l">
+                      <a:pPr indent="0" lvl="0" marL="0" rtl="0" algn="ctr">
                         <a:spcBef>
                           <a:spcPts val="0"/>
                         </a:spcBef>
@@ -17078,10 +17117,10 @@
                         <a:buNone/>
                       </a:pPr>
                       <a:r>
-                        <a:rPr lang="es" sz="1200"/>
-                        <a:t>0,523</a:t>
+                        <a:rPr lang="es" sz="1300"/>
+                        <a:t>0,541</a:t>
                       </a:r>
-                      <a:endParaRPr sz="1200"/>
+                      <a:endParaRPr sz="1300"/>
                     </a:p>
                   </a:txBody>
                   <a:tcPr marT="91425" marB="91425" marR="91425" marL="91425"/>
@@ -17091,7 +17130,7 @@
                     <a:bodyPr/>
                     <a:lstStyle/>
                     <a:p>
-                      <a:pPr indent="0" lvl="0" marL="0" rtl="0" algn="l">
+                      <a:pPr indent="0" lvl="0" marL="0" rtl="0" algn="ctr">
                         <a:spcBef>
                           <a:spcPts val="0"/>
                         </a:spcBef>
@@ -17101,10 +17140,10 @@
                         <a:buNone/>
                       </a:pPr>
                       <a:r>
-                        <a:rPr lang="es" sz="1200"/>
-                        <a:t>0,643</a:t>
+                        <a:rPr lang="es" sz="1300"/>
+                        <a:t>0,659</a:t>
                       </a:r>
-                      <a:endParaRPr sz="1200"/>
+                      <a:endParaRPr sz="1300"/>
                     </a:p>
                   </a:txBody>
                   <a:tcPr marT="91425" marB="91425" marR="91425" marL="91425"/>
@@ -17114,45 +17153,6 @@
           </a:graphicData>
         </a:graphic>
       </p:graphicFrame>
-      <p:sp>
-        <p:nvSpPr>
-          <p:cNvPr id="353" name="Google Shape;353;p23"/>
-          <p:cNvSpPr txBox="1"/>
-          <p:nvPr>
-            <p:ph idx="1" type="body"/>
-          </p:nvPr>
-        </p:nvSpPr>
-        <p:spPr>
-          <a:xfrm>
-            <a:off x="4253350" y="2679450"/>
-            <a:ext cx="3745800" cy="1974900"/>
-          </a:xfrm>
-          <a:prstGeom prst="rect">
-            <a:avLst/>
-          </a:prstGeom>
-        </p:spPr>
-        <p:txBody>
-          <a:bodyPr anchorCtr="0" anchor="t" bIns="91425" lIns="91425" spcFirstLastPara="1" rIns="91425" wrap="square" tIns="91425">
-            <a:normAutofit/>
-          </a:bodyPr>
-          <a:lstStyle/>
-          <a:p>
-            <a:pPr indent="0" lvl="0" marL="0" rtl="0" algn="l">
-              <a:spcBef>
-                <a:spcPts val="0"/>
-              </a:spcBef>
-              <a:spcAft>
-                <a:spcPts val="1200"/>
-              </a:spcAft>
-              <a:buNone/>
-            </a:pPr>
-            <a:r>
-              <a:t/>
-            </a:r>
-            <a:endParaRPr/>
-          </a:p>
-        </p:txBody>
-      </p:sp>
     </p:spTree>
   </p:cSld>
   <p:clrMapOvr>
@@ -17257,37 +17257,9 @@
           </a:p>
         </p:txBody>
       </p:sp>
-      <p:pic>
-        <p:nvPicPr>
-          <p:cNvPr id="360" name="Google Shape;360;p24"/>
-          <p:cNvPicPr preferRelativeResize="0"/>
-          <p:nvPr/>
-        </p:nvPicPr>
-        <p:blipFill>
-          <a:blip r:embed="rId3">
-            <a:alphaModFix/>
-          </a:blip>
-          <a:stretch>
-            <a:fillRect/>
-          </a:stretch>
-        </p:blipFill>
-        <p:spPr>
-          <a:xfrm>
-            <a:off x="1369500" y="2679459"/>
-            <a:ext cx="2651050" cy="2223190"/>
-          </a:xfrm>
-          <a:prstGeom prst="rect">
-            <a:avLst/>
-          </a:prstGeom>
-          <a:noFill/>
-          <a:ln>
-            <a:noFill/>
-          </a:ln>
-        </p:spPr>
-      </p:pic>
       <p:sp>
         <p:nvSpPr>
-          <p:cNvPr id="361" name="Google Shape;361;p24"/>
+          <p:cNvPr id="360" name="Google Shape;360;p24"/>
           <p:cNvSpPr txBox="1"/>
           <p:nvPr/>
         </p:nvSpPr>
@@ -17337,6 +17309,34 @@
           </a:p>
         </p:txBody>
       </p:sp>
+      <p:pic>
+        <p:nvPicPr>
+          <p:cNvPr id="361" name="Google Shape;361;p24"/>
+          <p:cNvPicPr preferRelativeResize="0"/>
+          <p:nvPr/>
+        </p:nvPicPr>
+        <p:blipFill>
+          <a:blip r:embed="rId3">
+            <a:alphaModFix/>
+          </a:blip>
+          <a:stretch>
+            <a:fillRect/>
+          </a:stretch>
+        </p:blipFill>
+        <p:spPr>
+          <a:xfrm>
+            <a:off x="799275" y="2324725"/>
+            <a:ext cx="3009900" cy="2524125"/>
+          </a:xfrm>
+          <a:prstGeom prst="rect">
+            <a:avLst/>
+          </a:prstGeom>
+          <a:noFill/>
+          <a:ln>
+            <a:noFill/>
+          </a:ln>
+        </p:spPr>
+      </p:pic>
       <p:graphicFrame>
         <p:nvGraphicFramePr>
           <p:cNvPr id="362" name="Google Shape;362;p24"/>
@@ -17344,7 +17344,7 @@
           <p:nvPr/>
         </p:nvGraphicFramePr>
         <p:xfrm>
-          <a:off x="2889875" y="1321450"/>
+          <a:off x="2639988" y="1195200"/>
           <a:ext cx="3000000" cy="3000000"/>
         </p:xfrm>
         <a:graphic>
@@ -17352,14 +17352,14 @@
             <a:tbl>
               <a:tblPr>
                 <a:noFill/>
-                <a:tableStyleId>{FC53CDBA-9641-4111-BCFE-086303AC1159}</a:tableStyleId>
+                <a:tableStyleId>{926FB249-70D4-4473-B52E-7140CC5C91D0}</a:tableStyleId>
               </a:tblPr>
               <a:tblGrid>
-                <a:gridCol w="1209550"/>
-                <a:gridCol w="1198675"/>
-                <a:gridCol w="1209550"/>
-                <a:gridCol w="1209550"/>
-                <a:gridCol w="1198675"/>
+                <a:gridCol w="1068300"/>
+                <a:gridCol w="1134575"/>
+                <a:gridCol w="1257125"/>
+                <a:gridCol w="1096725"/>
+                <a:gridCol w="1137575"/>
               </a:tblGrid>
               <a:tr h="190500">
                 <a:tc>
@@ -17367,7 +17367,7 @@
                     <a:bodyPr/>
                     <a:lstStyle/>
                     <a:p>
-                      <a:pPr indent="0" lvl="0" marL="0" rtl="0" algn="l">
+                      <a:pPr indent="0" lvl="0" marL="0" rtl="0" algn="ctr">
                         <a:spcBef>
                           <a:spcPts val="0"/>
                         </a:spcBef>
@@ -17390,7 +17390,7 @@
                     <a:bodyPr/>
                     <a:lstStyle/>
                     <a:p>
-                      <a:pPr indent="0" lvl="0" marL="0" rtl="0" algn="l">
+                      <a:pPr indent="0" lvl="0" marL="0" rtl="0" algn="ctr">
                         <a:spcBef>
                           <a:spcPts val="0"/>
                         </a:spcBef>
@@ -17413,7 +17413,7 @@
                     <a:bodyPr/>
                     <a:lstStyle/>
                     <a:p>
-                      <a:pPr indent="0" lvl="0" marL="0" rtl="0" algn="l">
+                      <a:pPr indent="0" lvl="0" marL="0" rtl="0" algn="ctr">
                         <a:spcBef>
                           <a:spcPts val="0"/>
                         </a:spcBef>
@@ -17436,7 +17436,7 @@
                     <a:bodyPr/>
                     <a:lstStyle/>
                     <a:p>
-                      <a:pPr indent="0" lvl="0" marL="0" rtl="0" algn="l">
+                      <a:pPr indent="0" lvl="0" marL="0" rtl="0" algn="ctr">
                         <a:spcBef>
                           <a:spcPts val="0"/>
                         </a:spcBef>
@@ -17459,7 +17459,7 @@
                     <a:bodyPr/>
                     <a:lstStyle/>
                     <a:p>
-                      <a:pPr indent="0" lvl="0" marL="0" rtl="0" algn="l">
+                      <a:pPr indent="0" lvl="0" marL="0" rtl="0" algn="ctr">
                         <a:spcBef>
                           <a:spcPts val="0"/>
                         </a:spcBef>
@@ -17478,13 +17478,105 @@
                   <a:tcPr marT="91425" marB="91425" marR="91425" marL="91425"/>
                 </a:tc>
               </a:tr>
-              <a:tr h="190500">
+              <a:tr h="342900">
                 <a:tc>
                   <a:txBody>
                     <a:bodyPr/>
                     <a:lstStyle/>
                     <a:p>
-                      <a:pPr indent="0" lvl="0" marL="0" rtl="0" algn="l">
+                      <a:pPr indent="0" lvl="0" marL="0" rtl="0" algn="ctr">
+                        <a:spcBef>
+                          <a:spcPts val="0"/>
+                        </a:spcBef>
+                        <a:spcAft>
+                          <a:spcPts val="0"/>
+                        </a:spcAft>
+                        <a:buNone/>
+                      </a:pPr>
+                      <a:r>
+                        <a:rPr lang="es" sz="1300"/>
+                        <a:t>0,882</a:t>
+                      </a:r>
+                      <a:endParaRPr sz="1300"/>
+                    </a:p>
+                  </a:txBody>
+                  <a:tcPr marT="91425" marB="91425" marR="91425" marL="91425"/>
+                </a:tc>
+                <a:tc>
+                  <a:txBody>
+                    <a:bodyPr/>
+                    <a:lstStyle/>
+                    <a:p>
+                      <a:pPr indent="0" lvl="0" marL="0" rtl="0" algn="ctr">
+                        <a:spcBef>
+                          <a:spcPts val="0"/>
+                        </a:spcBef>
+                        <a:spcAft>
+                          <a:spcPts val="0"/>
+                        </a:spcAft>
+                        <a:buNone/>
+                      </a:pPr>
+                      <a:r>
+                        <a:rPr lang="es" sz="1300"/>
+                        <a:t>0,769</a:t>
+                      </a:r>
+                      <a:endParaRPr sz="1300"/>
+                    </a:p>
+                  </a:txBody>
+                  <a:tcPr marT="91425" marB="91425" marR="91425" marL="91425"/>
+                </a:tc>
+                <a:tc>
+                  <a:txBody>
+                    <a:bodyPr/>
+                    <a:lstStyle/>
+                    <a:p>
+                      <a:pPr indent="0" lvl="0" marL="0" rtl="0" algn="ctr">
+                        <a:spcBef>
+                          <a:spcPts val="0"/>
+                        </a:spcBef>
+                        <a:spcAft>
+                          <a:spcPts val="0"/>
+                        </a:spcAft>
+                        <a:buNone/>
+                      </a:pPr>
+                      <a:r>
+                        <a:rPr lang="es" sz="1300"/>
+                        <a:t>0,736</a:t>
+                      </a:r>
+                      <a:endParaRPr sz="1300"/>
+                    </a:p>
+                  </a:txBody>
+                  <a:tcPr marT="91425" marB="91425" marR="91425" marL="91425"/>
+                </a:tc>
+                <a:tc>
+                  <a:txBody>
+                    <a:bodyPr/>
+                    <a:lstStyle/>
+                    <a:p>
+                      <a:pPr indent="0" lvl="0" marL="0" rtl="0" algn="ctr">
+                        <a:spcBef>
+                          <a:spcPts val="0"/>
+                        </a:spcBef>
+                        <a:spcAft>
+                          <a:spcPts val="0"/>
+                        </a:spcAft>
+                        <a:buNone/>
+                      </a:pPr>
+                      <a:r>
+                        <a:rPr lang="es" sz="1300"/>
+                        <a:t>0,590</a:t>
+                      </a:r>
+                      <a:endParaRPr sz="1300"/>
+                    </a:p>
+                  </a:txBody>
+                  <a:tcPr marT="91425" marB="91425" marR="91425" marL="91425"/>
+                </a:tc>
+                <a:tc>
+                  <a:txBody>
+                    <a:bodyPr/>
+                    <a:lstStyle/>
+                    <a:p>
+                      <a:pPr indent="0" lvl="0" marL="0" rtl="0" algn="ctr">
                         <a:spcBef>
                           <a:spcPts val="0"/>
                         </a:spcBef>
@@ -17495,99 +17587,7 @@
                       </a:pPr>
                       <a:r>
                         <a:rPr lang="es" sz="1200"/>
-                        <a:t>0,999</a:t>
-                      </a:r>
-                      <a:endParaRPr sz="1200"/>
-                    </a:p>
-                  </a:txBody>
-                  <a:tcPr marT="91425" marB="91425" marR="91425" marL="91425"/>
-                </a:tc>
-                <a:tc>
-                  <a:txBody>
-                    <a:bodyPr/>
-                    <a:lstStyle/>
-                    <a:p>
-                      <a:pPr indent="0" lvl="0" marL="0" rtl="0" algn="l">
-                        <a:spcBef>
-                          <a:spcPts val="0"/>
-                        </a:spcBef>
-                        <a:spcAft>
-                          <a:spcPts val="0"/>
-                        </a:spcAft>
-                        <a:buNone/>
-                      </a:pPr>
-                      <a:r>
-                        <a:rPr lang="es" sz="1200"/>
-                        <a:t>0,782</a:t>
-                      </a:r>
-                      <a:endParaRPr sz="1200"/>
-                    </a:p>
-                  </a:txBody>
-                  <a:tcPr marT="91425" marB="91425" marR="91425" marL="91425"/>
-                </a:tc>
-                <a:tc>
-                  <a:txBody>
-                    <a:bodyPr/>
-                    <a:lstStyle/>
-                    <a:p>
-                      <a:pPr indent="0" lvl="0" marL="0" rtl="0" algn="l">
-                        <a:spcBef>
-                          <a:spcPts val="0"/>
-                        </a:spcBef>
-                        <a:spcAft>
-                          <a:spcPts val="0"/>
-                        </a:spcAft>
-                        <a:buNone/>
-                      </a:pPr>
-                      <a:r>
-                        <a:rPr lang="es" sz="1200"/>
-                        <a:t>0,764</a:t>
-                      </a:r>
-                      <a:endParaRPr sz="1200"/>
-                    </a:p>
-                  </a:txBody>
-                  <a:tcPr marT="91425" marB="91425" marR="91425" marL="91425"/>
-                </a:tc>
-                <a:tc>
-                  <a:txBody>
-                    <a:bodyPr/>
-                    <a:lstStyle/>
-                    <a:p>
-                      <a:pPr indent="0" lvl="0" marL="0" rtl="0" algn="l">
-                        <a:spcBef>
-                          <a:spcPts val="0"/>
-                        </a:spcBef>
-                        <a:spcAft>
-                          <a:spcPts val="0"/>
-                        </a:spcAft>
-                        <a:buNone/>
-                      </a:pPr>
-                      <a:r>
-                        <a:rPr lang="es" sz="1200"/>
-                        <a:t>0,599</a:t>
-                      </a:r>
-                      <a:endParaRPr sz="1200"/>
-                    </a:p>
-                  </a:txBody>
-                  <a:tcPr marT="91425" marB="91425" marR="91425" marL="91425"/>
-                </a:tc>
-                <a:tc>
-                  <a:txBody>
-                    <a:bodyPr/>
-                    <a:lstStyle/>
-                    <a:p>
-                      <a:pPr indent="0" lvl="0" marL="0" rtl="0" algn="l">
-                        <a:spcBef>
-                          <a:spcPts val="0"/>
-                        </a:spcBef>
-                        <a:spcAft>
-                          <a:spcPts val="0"/>
-                        </a:spcAft>
-                        <a:buNone/>
-                      </a:pPr>
-                      <a:r>
-                        <a:rPr lang="es" sz="1200"/>
-                        <a:t>0,672</a:t>
+                        <a:t>0,655</a:t>
                       </a:r>
                       <a:endParaRPr sz="1200"/>
                     </a:p>
@@ -17716,14 +17716,42 @@
           </a:p>
         </p:txBody>
       </p:sp>
+      <p:pic>
+        <p:nvPicPr>
+          <p:cNvPr id="369" name="Google Shape;369;p25"/>
+          <p:cNvPicPr preferRelativeResize="0"/>
+          <p:nvPr/>
+        </p:nvPicPr>
+        <p:blipFill>
+          <a:blip r:embed="rId3">
+            <a:alphaModFix/>
+          </a:blip>
+          <a:stretch>
+            <a:fillRect/>
+          </a:stretch>
+        </p:blipFill>
+        <p:spPr>
+          <a:xfrm>
+            <a:off x="3865525" y="1195199"/>
+            <a:ext cx="4662925" cy="2281725"/>
+          </a:xfrm>
+          <a:prstGeom prst="rect">
+            <a:avLst/>
+          </a:prstGeom>
+          <a:noFill/>
+          <a:ln>
+            <a:noFill/>
+          </a:ln>
+        </p:spPr>
+      </p:pic>
       <p:graphicFrame>
         <p:nvGraphicFramePr>
-          <p:cNvPr id="369" name="Google Shape;369;p25"/>
+          <p:cNvPr id="370" name="Google Shape;370;p25"/>
           <p:cNvGraphicFramePr/>
           <p:nvPr/>
         </p:nvGraphicFramePr>
         <p:xfrm>
-          <a:off x="880800" y="3592400"/>
+          <a:off x="655213" y="3555825"/>
           <a:ext cx="3000000" cy="3000000"/>
         </p:xfrm>
         <a:graphic>
@@ -17731,15 +17759,15 @@
             <a:tbl>
               <a:tblPr>
                 <a:noFill/>
-                <a:tableStyleId>{FC53CDBA-9641-4111-BCFE-086303AC1159}</a:tableStyleId>
+                <a:tableStyleId>{926FB249-70D4-4473-B52E-7140CC5C91D0}</a:tableStyleId>
               </a:tblPr>
               <a:tblGrid>
-                <a:gridCol w="2092250"/>
-                <a:gridCol w="1209550"/>
-                <a:gridCol w="1198675"/>
-                <a:gridCol w="1209550"/>
-                <a:gridCol w="1209550"/>
-                <a:gridCol w="1198675"/>
+                <a:gridCol w="2633375"/>
+                <a:gridCol w="1068300"/>
+                <a:gridCol w="1134575"/>
+                <a:gridCol w="1257125"/>
+                <a:gridCol w="1096725"/>
+                <a:gridCol w="1137575"/>
               </a:tblGrid>
               <a:tr h="190500">
                 <a:tc>
@@ -17757,9 +17785,10 @@
                         <a:buNone/>
                       </a:pPr>
                       <a:r>
-                        <a:t/>
+                        <a:rPr b="1" lang="es" sz="1200"/>
+                        <a:t>Model</a:t>
                       </a:r>
-                      <a:endParaRPr b="1" sz="800"/>
+                      <a:endParaRPr b="1" sz="1200"/>
                     </a:p>
                   </a:txBody>
                   <a:tcPr marT="91425" marB="91425" marR="91425" marL="91425"/>
@@ -17769,7 +17798,7 @@
                     <a:bodyPr/>
                     <a:lstStyle/>
                     <a:p>
-                      <a:pPr indent="0" lvl="0" marL="0" rtl="0" algn="l">
+                      <a:pPr indent="0" lvl="0" marL="0" rtl="0" algn="ctr">
                         <a:spcBef>
                           <a:spcPts val="0"/>
                         </a:spcBef>
@@ -17792,7 +17821,7 @@
                     <a:bodyPr/>
                     <a:lstStyle/>
                     <a:p>
-                      <a:pPr indent="0" lvl="0" marL="0" rtl="0" algn="l">
+                      <a:pPr indent="0" lvl="0" marL="0" rtl="0" algn="ctr">
                         <a:spcBef>
                           <a:spcPts val="0"/>
                         </a:spcBef>
@@ -17815,7 +17844,7 @@
                     <a:bodyPr/>
                     <a:lstStyle/>
                     <a:p>
-                      <a:pPr indent="0" lvl="0" marL="0" rtl="0" algn="l">
+                      <a:pPr indent="0" lvl="0" marL="0" rtl="0" algn="ctr">
                         <a:spcBef>
                           <a:spcPts val="0"/>
                         </a:spcBef>
@@ -17838,7 +17867,7 @@
                     <a:bodyPr/>
                     <a:lstStyle/>
                     <a:p>
-                      <a:pPr indent="0" lvl="0" marL="0" rtl="0" algn="l">
+                      <a:pPr indent="0" lvl="0" marL="0" rtl="0" algn="ctr">
                         <a:spcBef>
                           <a:spcPts val="0"/>
                         </a:spcBef>
@@ -17861,7 +17890,7 @@
                     <a:bodyPr/>
                     <a:lstStyle/>
                     <a:p>
-                      <a:pPr indent="0" lvl="0" marL="0" rtl="0" algn="l">
+                      <a:pPr indent="0" lvl="0" marL="0" rtl="0" algn="ctr">
                         <a:spcBef>
                           <a:spcPts val="0"/>
                         </a:spcBef>
@@ -17880,7 +17909,7 @@
                   <a:tcPr marT="91425" marB="91425" marR="91425" marL="91425"/>
                 </a:tc>
               </a:tr>
-              <a:tr h="190500">
+              <a:tr h="342900">
                 <a:tc>
                   <a:txBody>
                     <a:bodyPr/>
@@ -17896,14 +17925,131 @@
                         <a:buNone/>
                       </a:pPr>
                       <a:r>
-                        <a:rPr b="1" lang="es" sz="1200"/>
+                        <a:rPr lang="es" sz="1300"/>
                         <a:t>Modelo 1: Decision Tree</a:t>
                       </a:r>
-                      <a:endParaRPr b="1" sz="1200"/>
+                      <a:endParaRPr sz="1300"/>
                     </a:p>
                   </a:txBody>
                   <a:tcPr marT="91425" marB="91425" marR="91425" marL="91425"/>
                 </a:tc>
+                <a:tc>
+                  <a:txBody>
+                    <a:bodyPr/>
+                    <a:lstStyle/>
+                    <a:p>
+                      <a:pPr indent="0" lvl="0" marL="0" rtl="0" algn="ctr">
+                        <a:spcBef>
+                          <a:spcPts val="0"/>
+                        </a:spcBef>
+                        <a:spcAft>
+                          <a:spcPts val="0"/>
+                        </a:spcAft>
+                        <a:buNone/>
+                      </a:pPr>
+                      <a:r>
+                        <a:rPr lang="es" sz="1300"/>
+                        <a:t>0,807</a:t>
+                      </a:r>
+                      <a:endParaRPr sz="1300"/>
+                    </a:p>
+                  </a:txBody>
+                  <a:tcPr marT="91425" marB="91425" marR="91425" marL="91425"/>
+                </a:tc>
+                <a:tc>
+                  <a:txBody>
+                    <a:bodyPr/>
+                    <a:lstStyle/>
+                    <a:p>
+                      <a:pPr indent="0" lvl="0" marL="0" rtl="0" algn="ctr">
+                        <a:spcBef>
+                          <a:spcPts val="0"/>
+                        </a:spcBef>
+                        <a:spcAft>
+                          <a:spcPts val="0"/>
+                        </a:spcAft>
+                        <a:buNone/>
+                      </a:pPr>
+                      <a:r>
+                        <a:rPr lang="es" sz="1300"/>
+                        <a:t>0,792</a:t>
+                      </a:r>
+                      <a:endParaRPr sz="1300"/>
+                    </a:p>
+                  </a:txBody>
+                  <a:tcPr marT="91425" marB="91425" marR="91425" marL="91425"/>
+                </a:tc>
+                <a:tc>
+                  <a:txBody>
+                    <a:bodyPr/>
+                    <a:lstStyle/>
+                    <a:p>
+                      <a:pPr indent="0" lvl="0" marL="0" rtl="0" algn="ctr">
+                        <a:spcBef>
+                          <a:spcPts val="0"/>
+                        </a:spcBef>
+                        <a:spcAft>
+                          <a:spcPts val="0"/>
+                        </a:spcAft>
+                        <a:buNone/>
+                      </a:pPr>
+                      <a:r>
+                        <a:rPr lang="es" sz="1300"/>
+                        <a:t>0,845</a:t>
+                      </a:r>
+                      <a:endParaRPr sz="1300"/>
+                    </a:p>
+                  </a:txBody>
+                  <a:tcPr marT="91425" marB="91425" marR="91425" marL="91425"/>
+                </a:tc>
+                <a:tc>
+                  <a:txBody>
+                    <a:bodyPr/>
+                    <a:lstStyle/>
+                    <a:p>
+                      <a:pPr indent="0" lvl="0" marL="0" rtl="0" algn="ctr">
+                        <a:spcBef>
+                          <a:spcPts val="0"/>
+                        </a:spcBef>
+                        <a:spcAft>
+                          <a:spcPts val="0"/>
+                        </a:spcAft>
+                        <a:buNone/>
+                      </a:pPr>
+                      <a:r>
+                        <a:rPr lang="es" sz="1300"/>
+                        <a:t>0,541</a:t>
+                      </a:r>
+                      <a:endParaRPr sz="1300"/>
+                    </a:p>
+                  </a:txBody>
+                  <a:tcPr marT="91425" marB="91425" marR="91425" marL="91425"/>
+                </a:tc>
+                <a:tc>
+                  <a:txBody>
+                    <a:bodyPr/>
+                    <a:lstStyle/>
+                    <a:p>
+                      <a:pPr indent="0" lvl="0" marL="0" rtl="0" algn="ctr">
+                        <a:spcBef>
+                          <a:spcPts val="0"/>
+                        </a:spcBef>
+                        <a:spcAft>
+                          <a:spcPts val="0"/>
+                        </a:spcAft>
+                        <a:buNone/>
+                      </a:pPr>
+                      <a:r>
+                        <a:rPr lang="es" sz="1300"/>
+                        <a:t>0,659</a:t>
+                      </a:r>
+                      <a:endParaRPr sz="1300"/>
+                    </a:p>
+                  </a:txBody>
+                  <a:tcPr marT="91425" marB="91425" marR="91425" marL="91425"/>
+                </a:tc>
+              </a:tr>
+              <a:tr h="342900">
                 <a:tc>
                   <a:txBody>
                     <a:bodyPr/>
@@ -17919,10 +18065,10 @@
                         <a:buNone/>
                       </a:pPr>
                       <a:r>
-                        <a:rPr lang="es" sz="1200"/>
-                        <a:t>0,808</a:t>
+                        <a:rPr lang="es" sz="1300"/>
+                        <a:t>Modelo 2: Random Forest</a:t>
                       </a:r>
-                      <a:endParaRPr sz="1200"/>
+                      <a:endParaRPr sz="1300"/>
                     </a:p>
                   </a:txBody>
                   <a:tcPr marT="91425" marB="91425" marR="91425" marL="91425"/>
@@ -17932,7 +18078,99 @@
                     <a:bodyPr/>
                     <a:lstStyle/>
                     <a:p>
-                      <a:pPr indent="0" lvl="0" marL="0" rtl="0" algn="l">
+                      <a:pPr indent="0" lvl="0" marL="0" rtl="0" algn="ctr">
+                        <a:spcBef>
+                          <a:spcPts val="0"/>
+                        </a:spcBef>
+                        <a:spcAft>
+                          <a:spcPts val="0"/>
+                        </a:spcAft>
+                        <a:buNone/>
+                      </a:pPr>
+                      <a:r>
+                        <a:rPr lang="es" sz="1300"/>
+                        <a:t>0,882</a:t>
+                      </a:r>
+                      <a:endParaRPr sz="1300"/>
+                    </a:p>
+                  </a:txBody>
+                  <a:tcPr marT="91425" marB="91425" marR="91425" marL="91425"/>
+                </a:tc>
+                <a:tc>
+                  <a:txBody>
+                    <a:bodyPr/>
+                    <a:lstStyle/>
+                    <a:p>
+                      <a:pPr indent="0" lvl="0" marL="0" rtl="0" algn="ctr">
+                        <a:spcBef>
+                          <a:spcPts val="0"/>
+                        </a:spcBef>
+                        <a:spcAft>
+                          <a:spcPts val="0"/>
+                        </a:spcAft>
+                        <a:buNone/>
+                      </a:pPr>
+                      <a:r>
+                        <a:rPr lang="es" sz="1300"/>
+                        <a:t>0,769</a:t>
+                      </a:r>
+                      <a:endParaRPr sz="1300"/>
+                    </a:p>
+                  </a:txBody>
+                  <a:tcPr marT="91425" marB="91425" marR="91425" marL="91425"/>
+                </a:tc>
+                <a:tc>
+                  <a:txBody>
+                    <a:bodyPr/>
+                    <a:lstStyle/>
+                    <a:p>
+                      <a:pPr indent="0" lvl="0" marL="0" rtl="0" algn="ctr">
+                        <a:spcBef>
+                          <a:spcPts val="0"/>
+                        </a:spcBef>
+                        <a:spcAft>
+                          <a:spcPts val="0"/>
+                        </a:spcAft>
+                        <a:buNone/>
+                      </a:pPr>
+                      <a:r>
+                        <a:rPr lang="es" sz="1300"/>
+                        <a:t>0,736</a:t>
+                      </a:r>
+                      <a:endParaRPr sz="1300"/>
+                    </a:p>
+                  </a:txBody>
+                  <a:tcPr marT="91425" marB="91425" marR="91425" marL="91425"/>
+                </a:tc>
+                <a:tc>
+                  <a:txBody>
+                    <a:bodyPr/>
+                    <a:lstStyle/>
+                    <a:p>
+                      <a:pPr indent="0" lvl="0" marL="0" rtl="0" algn="ctr">
+                        <a:spcBef>
+                          <a:spcPts val="0"/>
+                        </a:spcBef>
+                        <a:spcAft>
+                          <a:spcPts val="0"/>
+                        </a:spcAft>
+                        <a:buNone/>
+                      </a:pPr>
+                      <a:r>
+                        <a:rPr lang="es" sz="1300"/>
+                        <a:t>0,590</a:t>
+                      </a:r>
+                      <a:endParaRPr sz="1300"/>
+                    </a:p>
+                  </a:txBody>
+                  <a:tcPr marT="91425" marB="91425" marR="91425" marL="91425"/>
+                </a:tc>
+                <a:tc>
+                  <a:txBody>
+                    <a:bodyPr/>
+                    <a:lstStyle/>
+                    <a:p>
+                      <a:pPr indent="0" lvl="0" marL="0" rtl="0" algn="ctr">
                         <a:spcBef>
                           <a:spcPts val="0"/>
                         </a:spcBef>
@@ -17943,216 +18181,7 @@
                       </a:pPr>
                       <a:r>
                         <a:rPr lang="es" sz="1200"/>
-                        <a:t>0,784</a:t>
-                      </a:r>
-                      <a:endParaRPr sz="1200"/>
-                    </a:p>
-                  </a:txBody>
-                  <a:tcPr marT="91425" marB="91425" marR="91425" marL="91425"/>
-                </a:tc>
-                <a:tc>
-                  <a:txBody>
-                    <a:bodyPr/>
-                    <a:lstStyle/>
-                    <a:p>
-                      <a:pPr indent="0" lvl="0" marL="0" rtl="0" algn="l">
-                        <a:spcBef>
-                          <a:spcPts val="0"/>
-                        </a:spcBef>
-                        <a:spcAft>
-                          <a:spcPts val="0"/>
-                        </a:spcAft>
-                        <a:buNone/>
-                      </a:pPr>
-                      <a:r>
-                        <a:rPr lang="es" sz="1200"/>
-                        <a:t>0,835</a:t>
-                      </a:r>
-                      <a:endParaRPr sz="1200"/>
-                    </a:p>
-                  </a:txBody>
-                  <a:tcPr marT="91425" marB="91425" marR="91425" marL="91425"/>
-                </a:tc>
-                <a:tc>
-                  <a:txBody>
-                    <a:bodyPr/>
-                    <a:lstStyle/>
-                    <a:p>
-                      <a:pPr indent="0" lvl="0" marL="0" rtl="0" algn="l">
-                        <a:spcBef>
-                          <a:spcPts val="0"/>
-                        </a:spcBef>
-                        <a:spcAft>
-                          <a:spcPts val="0"/>
-                        </a:spcAft>
-                        <a:buNone/>
-                      </a:pPr>
-                      <a:r>
-                        <a:rPr lang="es" sz="1200"/>
-                        <a:t>0,523</a:t>
-                      </a:r>
-                      <a:endParaRPr sz="1200"/>
-                    </a:p>
-                  </a:txBody>
-                  <a:tcPr marT="91425" marB="91425" marR="91425" marL="91425"/>
-                </a:tc>
-                <a:tc>
-                  <a:txBody>
-                    <a:bodyPr/>
-                    <a:lstStyle/>
-                    <a:p>
-                      <a:pPr indent="0" lvl="0" marL="0" rtl="0" algn="l">
-                        <a:spcBef>
-                          <a:spcPts val="0"/>
-                        </a:spcBef>
-                        <a:spcAft>
-                          <a:spcPts val="0"/>
-                        </a:spcAft>
-                        <a:buNone/>
-                      </a:pPr>
-                      <a:r>
-                        <a:rPr lang="es" sz="1200"/>
-                        <a:t>0,643</a:t>
-                      </a:r>
-                      <a:endParaRPr sz="1200"/>
-                    </a:p>
-                  </a:txBody>
-                  <a:tcPr marT="91425" marB="91425" marR="91425" marL="91425"/>
-                </a:tc>
-              </a:tr>
-              <a:tr h="190500">
-                <a:tc>
-                  <a:txBody>
-                    <a:bodyPr/>
-                    <a:lstStyle/>
-                    <a:p>
-                      <a:pPr indent="0" lvl="0" marL="0" rtl="0" algn="l">
-                        <a:spcBef>
-                          <a:spcPts val="0"/>
-                        </a:spcBef>
-                        <a:spcAft>
-                          <a:spcPts val="0"/>
-                        </a:spcAft>
-                        <a:buNone/>
-                      </a:pPr>
-                      <a:r>
-                        <a:rPr b="1" lang="es" sz="1200"/>
-                        <a:t>Modelo 2: Random Forest</a:t>
-                      </a:r>
-                      <a:endParaRPr b="1" sz="1200"/>
-                    </a:p>
-                  </a:txBody>
-                  <a:tcPr marT="91425" marB="91425" marR="91425" marL="91425"/>
-                </a:tc>
-                <a:tc>
-                  <a:txBody>
-                    <a:bodyPr/>
-                    <a:lstStyle/>
-                    <a:p>
-                      <a:pPr indent="0" lvl="0" marL="0" rtl="0" algn="l">
-                        <a:spcBef>
-                          <a:spcPts val="0"/>
-                        </a:spcBef>
-                        <a:spcAft>
-                          <a:spcPts val="0"/>
-                        </a:spcAft>
-                        <a:buNone/>
-                      </a:pPr>
-                      <a:r>
-                        <a:rPr lang="es" sz="1200"/>
-                        <a:t>0,999</a:t>
-                      </a:r>
-                      <a:endParaRPr sz="1200"/>
-                    </a:p>
-                  </a:txBody>
-                  <a:tcPr marT="91425" marB="91425" marR="91425" marL="91425"/>
-                </a:tc>
-                <a:tc>
-                  <a:txBody>
-                    <a:bodyPr/>
-                    <a:lstStyle/>
-                    <a:p>
-                      <a:pPr indent="0" lvl="0" marL="0" rtl="0" algn="l">
-                        <a:spcBef>
-                          <a:spcPts val="0"/>
-                        </a:spcBef>
-                        <a:spcAft>
-                          <a:spcPts val="0"/>
-                        </a:spcAft>
-                        <a:buNone/>
-                      </a:pPr>
-                      <a:r>
-                        <a:rPr lang="es" sz="1200"/>
-                        <a:t>0,782</a:t>
-                      </a:r>
-                      <a:endParaRPr sz="1200"/>
-                    </a:p>
-                  </a:txBody>
-                  <a:tcPr marT="91425" marB="91425" marR="91425" marL="91425"/>
-                </a:tc>
-                <a:tc>
-                  <a:txBody>
-                    <a:bodyPr/>
-                    <a:lstStyle/>
-                    <a:p>
-                      <a:pPr indent="0" lvl="0" marL="0" rtl="0" algn="l">
-                        <a:spcBef>
-                          <a:spcPts val="0"/>
-                        </a:spcBef>
-                        <a:spcAft>
-                          <a:spcPts val="0"/>
-                        </a:spcAft>
-                        <a:buNone/>
-                      </a:pPr>
-                      <a:r>
-                        <a:rPr lang="es" sz="1200"/>
-                        <a:t>0,764</a:t>
-                      </a:r>
-                      <a:endParaRPr sz="1200"/>
-                    </a:p>
-                  </a:txBody>
-                  <a:tcPr marT="91425" marB="91425" marR="91425" marL="91425"/>
-                </a:tc>
-                <a:tc>
-                  <a:txBody>
-                    <a:bodyPr/>
-                    <a:lstStyle/>
-                    <a:p>
-                      <a:pPr indent="0" lvl="0" marL="0" rtl="0" algn="l">
-                        <a:spcBef>
-                          <a:spcPts val="0"/>
-                        </a:spcBef>
-                        <a:spcAft>
-                          <a:spcPts val="0"/>
-                        </a:spcAft>
-                        <a:buNone/>
-                      </a:pPr>
-                      <a:r>
-                        <a:rPr lang="es" sz="1200"/>
-                        <a:t>0,599</a:t>
-                      </a:r>
-                      <a:endParaRPr sz="1200"/>
-                    </a:p>
-                  </a:txBody>
-                  <a:tcPr marT="91425" marB="91425" marR="91425" marL="91425"/>
-                </a:tc>
-                <a:tc>
-                  <a:txBody>
-                    <a:bodyPr/>
-                    <a:lstStyle/>
-                    <a:p>
-                      <a:pPr indent="0" lvl="0" marL="0" rtl="0" algn="l">
-                        <a:spcBef>
-                          <a:spcPts val="0"/>
-                        </a:spcBef>
-                        <a:spcAft>
-                          <a:spcPts val="0"/>
-                        </a:spcAft>
-                        <a:buNone/>
-                      </a:pPr>
-                      <a:r>
-                        <a:rPr lang="es" sz="1200"/>
-                        <a:t>0,672</a:t>
+                        <a:t>0,655</a:t>
                       </a:r>
                       <a:endParaRPr sz="1200"/>
                     </a:p>
@@ -18164,34 +18193,6 @@
           </a:graphicData>
         </a:graphic>
       </p:graphicFrame>
-      <p:pic>
-        <p:nvPicPr>
-          <p:cNvPr id="370" name="Google Shape;370;p25"/>
-          <p:cNvPicPr preferRelativeResize="0"/>
-          <p:nvPr/>
-        </p:nvPicPr>
-        <p:blipFill>
-          <a:blip r:embed="rId3">
-            <a:alphaModFix/>
-          </a:blip>
-          <a:stretch>
-            <a:fillRect/>
-          </a:stretch>
-        </p:blipFill>
-        <p:spPr>
-          <a:xfrm>
-            <a:off x="4182600" y="1195191"/>
-            <a:ext cx="4408951" cy="2157459"/>
-          </a:xfrm>
-          <a:prstGeom prst="rect">
-            <a:avLst/>
-          </a:prstGeom>
-          <a:noFill/>
-          <a:ln>
-            <a:noFill/>
-          </a:ln>
-        </p:spPr>
-      </p:pic>
     </p:spTree>
   </p:cSld>
   <p:clrMapOvr>
@@ -19905,8 +19906,8 @@
         </p:blipFill>
         <p:spPr>
           <a:xfrm>
-            <a:off x="3818625" y="1253375"/>
-            <a:ext cx="4695676" cy="3669226"/>
+            <a:off x="3970575" y="1340050"/>
+            <a:ext cx="4147434" cy="3240827"/>
           </a:xfrm>
           <a:prstGeom prst="rect">
             <a:avLst/>
@@ -19926,6 +19927,285 @@
 </file>
 
 <file path=ppt/theme/theme1.xml><?xml version="1.0" encoding="utf-8"?>
+<a:theme xmlns:a="http://schemas.openxmlformats.org/drawingml/2006/main" xmlns:r="http://schemas.openxmlformats.org/officeDocument/2006/relationships" name="Momentum">
+  <a:themeElements>
+    <a:clrScheme name="Momentum">
+      <a:dk1>
+        <a:srgbClr val="C0791B"/>
+      </a:dk1>
+      <a:lt1>
+        <a:srgbClr val="FFFFFF"/>
+      </a:lt1>
+      <a:dk2>
+        <a:srgbClr val="424242"/>
+      </a:dk2>
+      <a:lt2>
+        <a:srgbClr val="8DD8D3"/>
+      </a:lt2>
+      <a:accent1>
+        <a:srgbClr val="0B6374"/>
+      </a:accent1>
+      <a:accent2>
+        <a:srgbClr val="FD5B58"/>
+      </a:accent2>
+      <a:accent3>
+        <a:srgbClr val="599191"/>
+      </a:accent3>
+      <a:accent4>
+        <a:srgbClr val="D7E6A3"/>
+      </a:accent4>
+      <a:accent5>
+        <a:srgbClr val="27278B"/>
+      </a:accent5>
+      <a:accent6>
+        <a:srgbClr val="D558AB"/>
+      </a:accent6>
+      <a:hlink>
+        <a:srgbClr val="27278B"/>
+      </a:hlink>
+      <a:folHlink>
+        <a:srgbClr val="27278B"/>
+      </a:folHlink>
+    </a:clrScheme>
+    <a:fontScheme name="Office">
+      <a:majorFont>
+        <a:latin typeface="Arial"/>
+        <a:ea typeface=""/>
+        <a:cs typeface=""/>
+        <a:font script="Jpan" typeface="ＭＳ Ｐゴシック"/>
+        <a:font script="Hang" typeface="맑은 고딕"/>
+        <a:font script="Hans" typeface="宋体"/>
+        <a:font script="Hant" typeface="新細明體"/>
+        <a:font script="Arab" typeface="Times New Roman"/>
+        <a:font script="Hebr" typeface="Times New Roman"/>
+        <a:font script="Thai" typeface="Angsana New"/>
+        <a:font script="Ethi" typeface="Nyala"/>
+        <a:font script="Beng" typeface="Vrinda"/>
+        <a:font script="Gujr" typeface="Shruti"/>
+        <a:font script="Khmr" typeface="MoolBoran"/>
+        <a:font script="Knda" typeface="Tunga"/>
+        <a:font script="Guru" typeface="Raavi"/>
+        <a:font script="Cans" typeface="Euphemia"/>
+        <a:font script="Cher" typeface="Plantagenet Cherokee"/>
+        <a:font script="Yiii" typeface="Microsoft Yi Baiti"/>
+        <a:font script="Tibt" typeface="Microsoft Himalaya"/>
+        <a:font script="Thaa" typeface="MV Boli"/>
+        <a:font script="Deva" typeface="Mangal"/>
+        <a:font script="Telu" typeface="Gautami"/>
+        <a:font script="Taml" typeface="Latha"/>
+        <a:font script="Syrc" typeface="Estrangelo Edessa"/>
+        <a:font script="Orya" typeface="Kalinga"/>
+        <a:font script="Mlym" typeface="Kartika"/>
+        <a:font script="Laoo" typeface="DokChampa"/>
+        <a:font script="Sinh" typeface="Iskoola Pota"/>
+        <a:font script="Mong" typeface="Mongolian Baiti"/>
+        <a:font script="Viet" typeface="Times New Roman"/>
+        <a:font script="Uigh" typeface="Microsoft Uighur"/>
+        <a:font script="Geor" typeface="Sylfaen"/>
+      </a:majorFont>
+      <a:minorFont>
+        <a:latin typeface="Arial"/>
+        <a:ea typeface=""/>
+        <a:cs typeface=""/>
+        <a:font script="Jpan" typeface="ＭＳ Ｐゴシック"/>
+        <a:font script="Hang" typeface="맑은 고딕"/>
+        <a:font script="Hans" typeface="宋体"/>
+        <a:font script="Hant" typeface="新細明體"/>
+        <a:font script="Arab" typeface="Arial"/>
+        <a:font script="Hebr" typeface="Arial"/>
+        <a:font script="Thai" typeface="Cordia New"/>
+        <a:font script="Ethi" typeface="Nyala"/>
+        <a:font script="Beng" typeface="Vrinda"/>
+        <a:font script="Gujr" typeface="Shruti"/>
+        <a:font script="Khmr" typeface="DaunPenh"/>
+        <a:font script="Knda" typeface="Tunga"/>
+        <a:font script="Guru" typeface="Raavi"/>
+        <a:font script="Cans" typeface="Euphemia"/>
+        <a:font script="Cher" typeface="Plantagenet Cherokee"/>
+        <a:font script="Yiii" typeface="Microsoft Yi Baiti"/>
+        <a:font script="Tibt" typeface="Microsoft Himalaya"/>
+        <a:font script="Thaa" typeface="MV Boli"/>
+        <a:font script="Deva" typeface="Mangal"/>
+        <a:font script="Telu" typeface="Gautami"/>
+        <a:font script="Taml" typeface="Latha"/>
+        <a:font script="Syrc" typeface="Estrangelo Edessa"/>
+        <a:font script="Orya" typeface="Kalinga"/>
+        <a:font script="Mlym" typeface="Kartika"/>
+        <a:font script="Laoo" typeface="DokChampa"/>
+        <a:font script="Sinh" typeface="Iskoola Pota"/>
+        <a:font script="Mong" typeface="Mongolian Baiti"/>
+        <a:font script="Viet" typeface="Arial"/>
+        <a:font script="Uigh" typeface="Microsoft Uighur"/>
+        <a:font script="Geor" typeface="Sylfaen"/>
+      </a:minorFont>
+    </a:fontScheme>
+    <a:fmtScheme name="Office">
+      <a:fillStyleLst>
+        <a:solidFill>
+          <a:schemeClr val="phClr"/>
+        </a:solidFill>
+        <a:gradFill rotWithShape="1">
+          <a:gsLst>
+            <a:gs pos="0">
+              <a:schemeClr val="phClr">
+                <a:tint val="50000"/>
+                <a:satMod val="300000"/>
+              </a:schemeClr>
+            </a:gs>
+            <a:gs pos="35000">
+              <a:schemeClr val="phClr">
+                <a:tint val="37000"/>
+                <a:satMod val="300000"/>
+              </a:schemeClr>
+            </a:gs>
+            <a:gs pos="100000">
+              <a:schemeClr val="phClr">
+                <a:tint val="15000"/>
+                <a:satMod val="350000"/>
+              </a:schemeClr>
+            </a:gs>
+          </a:gsLst>
+          <a:lin ang="16200000" scaled="1"/>
+        </a:gradFill>
+        <a:gradFill rotWithShape="1">
+          <a:gsLst>
+            <a:gs pos="0">
+              <a:schemeClr val="phClr">
+                <a:tint val="100000"/>
+                <a:shade val="100000"/>
+                <a:satMod val="130000"/>
+              </a:schemeClr>
+            </a:gs>
+            <a:gs pos="100000">
+              <a:schemeClr val="phClr">
+                <a:tint val="50000"/>
+                <a:shade val="100000"/>
+                <a:satMod val="350000"/>
+              </a:schemeClr>
+            </a:gs>
+          </a:gsLst>
+          <a:lin ang="16200000" scaled="0"/>
+        </a:gradFill>
+      </a:fillStyleLst>
+      <a:lnStyleLst>
+        <a:ln w="9525" cap="flat" cmpd="sng" algn="ctr">
+          <a:solidFill>
+            <a:schemeClr val="phClr">
+              <a:shade val="95000"/>
+              <a:satMod val="105000"/>
+            </a:schemeClr>
+          </a:solidFill>
+          <a:prstDash val="solid"/>
+        </a:ln>
+        <a:ln w="25400" cap="flat" cmpd="sng" algn="ctr">
+          <a:solidFill>
+            <a:schemeClr val="phClr"/>
+          </a:solidFill>
+          <a:prstDash val="solid"/>
+        </a:ln>
+        <a:ln w="38100" cap="flat" cmpd="sng" algn="ctr">
+          <a:solidFill>
+            <a:schemeClr val="phClr"/>
+          </a:solidFill>
+          <a:prstDash val="solid"/>
+        </a:ln>
+      </a:lnStyleLst>
+      <a:effectStyleLst>
+        <a:effectStyle>
+          <a:effectLst>
+            <a:outerShdw blurRad="40000" dist="20000" dir="5400000" rotWithShape="0">
+              <a:srgbClr val="000000">
+                <a:alpha val="38000"/>
+              </a:srgbClr>
+            </a:outerShdw>
+          </a:effectLst>
+        </a:effectStyle>
+        <a:effectStyle>
+          <a:effectLst>
+            <a:outerShdw blurRad="40000" dist="23000" dir="5400000" rotWithShape="0">
+              <a:srgbClr val="000000">
+                <a:alpha val="35000"/>
+              </a:srgbClr>
+            </a:outerShdw>
+          </a:effectLst>
+        </a:effectStyle>
+        <a:effectStyle>
+          <a:effectLst>
+            <a:outerShdw blurRad="40000" dist="23000" dir="5400000" rotWithShape="0">
+              <a:srgbClr val="000000">
+                <a:alpha val="35000"/>
+              </a:srgbClr>
+            </a:outerShdw>
+          </a:effectLst>
+          <a:scene3d>
+            <a:camera prst="orthographicFront">
+              <a:rot lat="0" lon="0" rev="0"/>
+            </a:camera>
+            <a:lightRig rig="threePt" dir="t">
+              <a:rot lat="0" lon="0" rev="1200000"/>
+            </a:lightRig>
+          </a:scene3d>
+          <a:sp3d>
+            <a:bevelT w="63500" h="25400"/>
+          </a:sp3d>
+        </a:effectStyle>
+      </a:effectStyleLst>
+      <a:bgFillStyleLst>
+        <a:solidFill>
+          <a:schemeClr val="phClr"/>
+        </a:solidFill>
+        <a:gradFill rotWithShape="1">
+          <a:gsLst>
+            <a:gs pos="0">
+              <a:schemeClr val="phClr">
+                <a:tint val="40000"/>
+                <a:satMod val="350000"/>
+              </a:schemeClr>
+            </a:gs>
+            <a:gs pos="40000">
+              <a:schemeClr val="phClr">
+                <a:tint val="45000"/>
+                <a:shade val="99000"/>
+                <a:satMod val="350000"/>
+              </a:schemeClr>
+            </a:gs>
+            <a:gs pos="100000">
+              <a:schemeClr val="phClr">
+                <a:shade val="20000"/>
+                <a:satMod val="255000"/>
+              </a:schemeClr>
+            </a:gs>
+          </a:gsLst>
+          <a:path path="circle">
+            <a:fillToRect l="50000" t="-80000" r="50000" b="180000"/>
+          </a:path>
+        </a:gradFill>
+        <a:gradFill rotWithShape="1">
+          <a:gsLst>
+            <a:gs pos="0">
+              <a:schemeClr val="phClr">
+                <a:tint val="80000"/>
+                <a:satMod val="300000"/>
+              </a:schemeClr>
+            </a:gs>
+            <a:gs pos="100000">
+              <a:schemeClr val="phClr">
+                <a:shade val="30000"/>
+                <a:satMod val="200000"/>
+              </a:schemeClr>
+            </a:gs>
+          </a:gsLst>
+          <a:path path="circle">
+            <a:fillToRect l="50000" t="50000" r="50000" b="50000"/>
+          </a:path>
+        </a:gradFill>
+      </a:bgFillStyleLst>
+    </a:fmtScheme>
+  </a:themeElements>
+</a:theme>
+</file>
+
+<file path=ppt/theme/theme2.xml><?xml version="1.0" encoding="utf-8"?>
 <a:theme xmlns:a="http://schemas.openxmlformats.org/drawingml/2006/main" xmlns:r="http://schemas.openxmlformats.org/officeDocument/2006/relationships">
   <a:themeElements>
     <a:clrScheme name="Default">
@@ -20202,283 +20482,4 @@
     </a:fmtScheme>
   </a:themeElements>
 </a:theme>
-</file>
-
-<file path=ppt/theme/theme2.xml><?xml version="1.0" encoding="utf-8"?>
-<a:theme xmlns:a="http://schemas.openxmlformats.org/drawingml/2006/main" xmlns:r="http://schemas.openxmlformats.org/officeDocument/2006/relationships" name="Momentum">
-  <a:themeElements>
-    <a:clrScheme name="Momentum">
-      <a:dk1>
-        <a:srgbClr val="C0791B"/>
-      </a:dk1>
-      <a:lt1>
-        <a:srgbClr val="FFFFFF"/>
-      </a:lt1>
-      <a:dk2>
-        <a:srgbClr val="424242"/>
-      </a:dk2>
-      <a:lt2>
-        <a:srgbClr val="8DD8D3"/>
-      </a:lt2>
-      <a:accent1>
-        <a:srgbClr val="0B6374"/>
-      </a:accent1>
-      <a:accent2>
-        <a:srgbClr val="FD5B58"/>
-      </a:accent2>
-      <a:accent3>
-        <a:srgbClr val="599191"/>
-      </a:accent3>
-      <a:accent4>
-        <a:srgbClr val="D7E6A3"/>
-      </a:accent4>
-      <a:accent5>
-        <a:srgbClr val="27278B"/>
-      </a:accent5>
-      <a:accent6>
-        <a:srgbClr val="D558AB"/>
-      </a:accent6>
-      <a:hlink>
-        <a:srgbClr val="27278B"/>
-      </a:hlink>
-      <a:folHlink>
-        <a:srgbClr val="27278B"/>
-      </a:folHlink>
-    </a:clrScheme>
-    <a:fontScheme name="Office">
-      <a:majorFont>
-        <a:latin typeface="Arial"/>
-        <a:ea typeface=""/>
-        <a:cs typeface=""/>
-        <a:font script="Jpan" typeface="ＭＳ Ｐゴシック"/>
-        <a:font script="Hang" typeface="맑은 고딕"/>
-        <a:font script="Hans" typeface="宋体"/>
-        <a:font script="Hant" typeface="新細明體"/>
-        <a:font script="Arab" typeface="Times New Roman"/>
-        <a:font script="Hebr" typeface="Times New Roman"/>
-        <a:font script="Thai" typeface="Angsana New"/>
-        <a:font script="Ethi" typeface="Nyala"/>
-        <a:font script="Beng" typeface="Vrinda"/>
-        <a:font script="Gujr" typeface="Shruti"/>
-        <a:font script="Khmr" typeface="MoolBoran"/>
-        <a:font script="Knda" typeface="Tunga"/>
-        <a:font script="Guru" typeface="Raavi"/>
-        <a:font script="Cans" typeface="Euphemia"/>
-        <a:font script="Cher" typeface="Plantagenet Cherokee"/>
-        <a:font script="Yiii" typeface="Microsoft Yi Baiti"/>
-        <a:font script="Tibt" typeface="Microsoft Himalaya"/>
-        <a:font script="Thaa" typeface="MV Boli"/>
-        <a:font script="Deva" typeface="Mangal"/>
-        <a:font script="Telu" typeface="Gautami"/>
-        <a:font script="Taml" typeface="Latha"/>
-        <a:font script="Syrc" typeface="Estrangelo Edessa"/>
-        <a:font script="Orya" typeface="Kalinga"/>
-        <a:font script="Mlym" typeface="Kartika"/>
-        <a:font script="Laoo" typeface="DokChampa"/>
-        <a:font script="Sinh" typeface="Iskoola Pota"/>
-        <a:font script="Mong" typeface="Mongolian Baiti"/>
-        <a:font script="Viet" typeface="Times New Roman"/>
-        <a:font script="Uigh" typeface="Microsoft Uighur"/>
-        <a:font script="Geor" typeface="Sylfaen"/>
-      </a:majorFont>
-      <a:minorFont>
-        <a:latin typeface="Arial"/>
-        <a:ea typeface=""/>
-        <a:cs typeface=""/>
-        <a:font script="Jpan" typeface="ＭＳ Ｐゴシック"/>
-        <a:font script="Hang" typeface="맑은 고딕"/>
-        <a:font script="Hans" typeface="宋体"/>
-        <a:font script="Hant" typeface="新細明體"/>
-        <a:font script="Arab" typeface="Arial"/>
-        <a:font script="Hebr" typeface="Arial"/>
-        <a:font script="Thai" typeface="Cordia New"/>
-        <a:font script="Ethi" typeface="Nyala"/>
-        <a:font script="Beng" typeface="Vrinda"/>
-        <a:font script="Gujr" typeface="Shruti"/>
-        <a:font script="Khmr" typeface="DaunPenh"/>
-        <a:font script="Knda" typeface="Tunga"/>
-        <a:font script="Guru" typeface="Raavi"/>
-        <a:font script="Cans" typeface="Euphemia"/>
-        <a:font script="Cher" typeface="Plantagenet Cherokee"/>
-        <a:font script="Yiii" typeface="Microsoft Yi Baiti"/>
-        <a:font script="Tibt" typeface="Microsoft Himalaya"/>
-        <a:font script="Thaa" typeface="MV Boli"/>
-        <a:font script="Deva" typeface="Mangal"/>
-        <a:font script="Telu" typeface="Gautami"/>
-        <a:font script="Taml" typeface="Latha"/>
-        <a:font script="Syrc" typeface="Estrangelo Edessa"/>
-        <a:font script="Orya" typeface="Kalinga"/>
-        <a:font script="Mlym" typeface="Kartika"/>
-        <a:font script="Laoo" typeface="DokChampa"/>
-        <a:font script="Sinh" typeface="Iskoola Pota"/>
-        <a:font script="Mong" typeface="Mongolian Baiti"/>
-        <a:font script="Viet" typeface="Arial"/>
-        <a:font script="Uigh" typeface="Microsoft Uighur"/>
-        <a:font script="Geor" typeface="Sylfaen"/>
-      </a:minorFont>
-    </a:fontScheme>
-    <a:fmtScheme name="Office">
-      <a:fillStyleLst>
-        <a:solidFill>
-          <a:schemeClr val="phClr"/>
-        </a:solidFill>
-        <a:gradFill rotWithShape="1">
-          <a:gsLst>
-            <a:gs pos="0">
-              <a:schemeClr val="phClr">
-                <a:tint val="50000"/>
-                <a:satMod val="300000"/>
-              </a:schemeClr>
-            </a:gs>
-            <a:gs pos="35000">
-              <a:schemeClr val="phClr">
-                <a:tint val="37000"/>
-                <a:satMod val="300000"/>
-              </a:schemeClr>
-            </a:gs>
-            <a:gs pos="100000">
-              <a:schemeClr val="phClr">
-                <a:tint val="15000"/>
-                <a:satMod val="350000"/>
-              </a:schemeClr>
-            </a:gs>
-          </a:gsLst>
-          <a:lin ang="16200000" scaled="1"/>
-        </a:gradFill>
-        <a:gradFill rotWithShape="1">
-          <a:gsLst>
-            <a:gs pos="0">
-              <a:schemeClr val="phClr">
-                <a:tint val="100000"/>
-                <a:shade val="100000"/>
-                <a:satMod val="130000"/>
-              </a:schemeClr>
-            </a:gs>
-            <a:gs pos="100000">
-              <a:schemeClr val="phClr">
-                <a:tint val="50000"/>
-                <a:shade val="100000"/>
-                <a:satMod val="350000"/>
-              </a:schemeClr>
-            </a:gs>
-          </a:gsLst>
-          <a:lin ang="16200000" scaled="0"/>
-        </a:gradFill>
-      </a:fillStyleLst>
-      <a:lnStyleLst>
-        <a:ln w="9525" cap="flat" cmpd="sng" algn="ctr">
-          <a:solidFill>
-            <a:schemeClr val="phClr">
-              <a:shade val="95000"/>
-              <a:satMod val="105000"/>
-            </a:schemeClr>
-          </a:solidFill>
-          <a:prstDash val="solid"/>
-        </a:ln>
-        <a:ln w="25400" cap="flat" cmpd="sng" algn="ctr">
-          <a:solidFill>
-            <a:schemeClr val="phClr"/>
-          </a:solidFill>
-          <a:prstDash val="solid"/>
-        </a:ln>
-        <a:ln w="38100" cap="flat" cmpd="sng" algn="ctr">
-          <a:solidFill>
-            <a:schemeClr val="phClr"/>
-          </a:solidFill>
-          <a:prstDash val="solid"/>
-        </a:ln>
-      </a:lnStyleLst>
-      <a:effectStyleLst>
-        <a:effectStyle>
-          <a:effectLst>
-            <a:outerShdw blurRad="40000" dist="20000" dir="5400000" rotWithShape="0">
-              <a:srgbClr val="000000">
-                <a:alpha val="38000"/>
-              </a:srgbClr>
-            </a:outerShdw>
-          </a:effectLst>
-        </a:effectStyle>
-        <a:effectStyle>
-          <a:effectLst>
-            <a:outerShdw blurRad="40000" dist="23000" dir="5400000" rotWithShape="0">
-              <a:srgbClr val="000000">
-                <a:alpha val="35000"/>
-              </a:srgbClr>
-            </a:outerShdw>
-          </a:effectLst>
-        </a:effectStyle>
-        <a:effectStyle>
-          <a:effectLst>
-            <a:outerShdw blurRad="40000" dist="23000" dir="5400000" rotWithShape="0">
-              <a:srgbClr val="000000">
-                <a:alpha val="35000"/>
-              </a:srgbClr>
-            </a:outerShdw>
-          </a:effectLst>
-          <a:scene3d>
-            <a:camera prst="orthographicFront">
-              <a:rot lat="0" lon="0" rev="0"/>
-            </a:camera>
-            <a:lightRig rig="threePt" dir="t">
-              <a:rot lat="0" lon="0" rev="1200000"/>
-            </a:lightRig>
-          </a:scene3d>
-          <a:sp3d>
-            <a:bevelT w="63500" h="25400"/>
-          </a:sp3d>
-        </a:effectStyle>
-      </a:effectStyleLst>
-      <a:bgFillStyleLst>
-        <a:solidFill>
-          <a:schemeClr val="phClr"/>
-        </a:solidFill>
-        <a:gradFill rotWithShape="1">
-          <a:gsLst>
-            <a:gs pos="0">
-              <a:schemeClr val="phClr">
-                <a:tint val="40000"/>
-                <a:satMod val="350000"/>
-              </a:schemeClr>
-            </a:gs>
-            <a:gs pos="40000">
-              <a:schemeClr val="phClr">
-                <a:tint val="45000"/>
-                <a:shade val="99000"/>
-                <a:satMod val="350000"/>
-              </a:schemeClr>
-            </a:gs>
-            <a:gs pos="100000">
-              <a:schemeClr val="phClr">
-                <a:shade val="20000"/>
-                <a:satMod val="255000"/>
-              </a:schemeClr>
-            </a:gs>
-          </a:gsLst>
-          <a:path path="circle">
-            <a:fillToRect l="50000" t="-80000" r="50000" b="180000"/>
-          </a:path>
-        </a:gradFill>
-        <a:gradFill rotWithShape="1">
-          <a:gsLst>
-            <a:gs pos="0">
-              <a:schemeClr val="phClr">
-                <a:tint val="80000"/>
-                <a:satMod val="300000"/>
-              </a:schemeClr>
-            </a:gs>
-            <a:gs pos="100000">
-              <a:schemeClr val="phClr">
-                <a:shade val="30000"/>
-                <a:satMod val="200000"/>
-              </a:schemeClr>
-            </a:gs>
-          </a:gsLst>
-          <a:path path="circle">
-            <a:fillToRect l="50000" t="50000" r="50000" b="50000"/>
-          </a:path>
-        </a:gradFill>
-      </a:bgFillStyleLst>
-    </a:fmtScheme>
-  </a:themeElements>
-</a:theme>
 </file>
</xml_diff>

<commit_message>
Ultima version del pptx
</commit_message>
<xml_diff>
--- a/Travel Insurance - Leandro Hornos.pptx
+++ b/Travel Insurance - Leandro Hornos.pptx
@@ -15117,6 +15117,285 @@
 </file>
 
 <file path=ppt/theme/theme1.xml><?xml version="1.0" encoding="utf-8"?>
+<a:theme xmlns:a="http://schemas.openxmlformats.org/drawingml/2006/main" xmlns:r="http://schemas.openxmlformats.org/officeDocument/2006/relationships" name="Simple Light">
+  <a:themeElements>
+    <a:clrScheme name="Simple Light">
+      <a:dk1>
+        <a:srgbClr val="000000"/>
+      </a:dk1>
+      <a:lt1>
+        <a:srgbClr val="FFFFFF"/>
+      </a:lt1>
+      <a:dk2>
+        <a:srgbClr val="595959"/>
+      </a:dk2>
+      <a:lt2>
+        <a:srgbClr val="EEEEEE"/>
+      </a:lt2>
+      <a:accent1>
+        <a:srgbClr val="4285F4"/>
+      </a:accent1>
+      <a:accent2>
+        <a:srgbClr val="212121"/>
+      </a:accent2>
+      <a:accent3>
+        <a:srgbClr val="78909C"/>
+      </a:accent3>
+      <a:accent4>
+        <a:srgbClr val="FFAB40"/>
+      </a:accent4>
+      <a:accent5>
+        <a:srgbClr val="0097A7"/>
+      </a:accent5>
+      <a:accent6>
+        <a:srgbClr val="EEFF41"/>
+      </a:accent6>
+      <a:hlink>
+        <a:srgbClr val="0097A7"/>
+      </a:hlink>
+      <a:folHlink>
+        <a:srgbClr val="0097A7"/>
+      </a:folHlink>
+    </a:clrScheme>
+    <a:fontScheme name="Office">
+      <a:majorFont>
+        <a:latin typeface="Arial"/>
+        <a:ea typeface=""/>
+        <a:cs typeface=""/>
+        <a:font script="Jpan" typeface="ＭＳ Ｐゴシック"/>
+        <a:font script="Hang" typeface="맑은 고딕"/>
+        <a:font script="Hans" typeface="宋体"/>
+        <a:font script="Hant" typeface="新細明體"/>
+        <a:font script="Arab" typeface="Times New Roman"/>
+        <a:font script="Hebr" typeface="Times New Roman"/>
+        <a:font script="Thai" typeface="Angsana New"/>
+        <a:font script="Ethi" typeface="Nyala"/>
+        <a:font script="Beng" typeface="Vrinda"/>
+        <a:font script="Gujr" typeface="Shruti"/>
+        <a:font script="Khmr" typeface="MoolBoran"/>
+        <a:font script="Knda" typeface="Tunga"/>
+        <a:font script="Guru" typeface="Raavi"/>
+        <a:font script="Cans" typeface="Euphemia"/>
+        <a:font script="Cher" typeface="Plantagenet Cherokee"/>
+        <a:font script="Yiii" typeface="Microsoft Yi Baiti"/>
+        <a:font script="Tibt" typeface="Microsoft Himalaya"/>
+        <a:font script="Thaa" typeface="MV Boli"/>
+        <a:font script="Deva" typeface="Mangal"/>
+        <a:font script="Telu" typeface="Gautami"/>
+        <a:font script="Taml" typeface="Latha"/>
+        <a:font script="Syrc" typeface="Estrangelo Edessa"/>
+        <a:font script="Orya" typeface="Kalinga"/>
+        <a:font script="Mlym" typeface="Kartika"/>
+        <a:font script="Laoo" typeface="DokChampa"/>
+        <a:font script="Sinh" typeface="Iskoola Pota"/>
+        <a:font script="Mong" typeface="Mongolian Baiti"/>
+        <a:font script="Viet" typeface="Times New Roman"/>
+        <a:font script="Uigh" typeface="Microsoft Uighur"/>
+        <a:font script="Geor" typeface="Sylfaen"/>
+      </a:majorFont>
+      <a:minorFont>
+        <a:latin typeface="Arial"/>
+        <a:ea typeface=""/>
+        <a:cs typeface=""/>
+        <a:font script="Jpan" typeface="ＭＳ Ｐゴシック"/>
+        <a:font script="Hang" typeface="맑은 고딕"/>
+        <a:font script="Hans" typeface="宋体"/>
+        <a:font script="Hant" typeface="新細明體"/>
+        <a:font script="Arab" typeface="Arial"/>
+        <a:font script="Hebr" typeface="Arial"/>
+        <a:font script="Thai" typeface="Cordia New"/>
+        <a:font script="Ethi" typeface="Nyala"/>
+        <a:font script="Beng" typeface="Vrinda"/>
+        <a:font script="Gujr" typeface="Shruti"/>
+        <a:font script="Khmr" typeface="DaunPenh"/>
+        <a:font script="Knda" typeface="Tunga"/>
+        <a:font script="Guru" typeface="Raavi"/>
+        <a:font script="Cans" typeface="Euphemia"/>
+        <a:font script="Cher" typeface="Plantagenet Cherokee"/>
+        <a:font script="Yiii" typeface="Microsoft Yi Baiti"/>
+        <a:font script="Tibt" typeface="Microsoft Himalaya"/>
+        <a:font script="Thaa" typeface="MV Boli"/>
+        <a:font script="Deva" typeface="Mangal"/>
+        <a:font script="Telu" typeface="Gautami"/>
+        <a:font script="Taml" typeface="Latha"/>
+        <a:font script="Syrc" typeface="Estrangelo Edessa"/>
+        <a:font script="Orya" typeface="Kalinga"/>
+        <a:font script="Mlym" typeface="Kartika"/>
+        <a:font script="Laoo" typeface="DokChampa"/>
+        <a:font script="Sinh" typeface="Iskoola Pota"/>
+        <a:font script="Mong" typeface="Mongolian Baiti"/>
+        <a:font script="Viet" typeface="Arial"/>
+        <a:font script="Uigh" typeface="Microsoft Uighur"/>
+        <a:font script="Geor" typeface="Sylfaen"/>
+      </a:minorFont>
+    </a:fontScheme>
+    <a:fmtScheme name="Office">
+      <a:fillStyleLst>
+        <a:solidFill>
+          <a:schemeClr val="phClr"/>
+        </a:solidFill>
+        <a:gradFill rotWithShape="1">
+          <a:gsLst>
+            <a:gs pos="0">
+              <a:schemeClr val="phClr">
+                <a:tint val="50000"/>
+                <a:satMod val="300000"/>
+              </a:schemeClr>
+            </a:gs>
+            <a:gs pos="35000">
+              <a:schemeClr val="phClr">
+                <a:tint val="37000"/>
+                <a:satMod val="300000"/>
+              </a:schemeClr>
+            </a:gs>
+            <a:gs pos="100000">
+              <a:schemeClr val="phClr">
+                <a:tint val="15000"/>
+                <a:satMod val="350000"/>
+              </a:schemeClr>
+            </a:gs>
+          </a:gsLst>
+          <a:lin ang="16200000" scaled="1"/>
+        </a:gradFill>
+        <a:gradFill rotWithShape="1">
+          <a:gsLst>
+            <a:gs pos="0">
+              <a:schemeClr val="phClr">
+                <a:tint val="100000"/>
+                <a:shade val="100000"/>
+                <a:satMod val="130000"/>
+              </a:schemeClr>
+            </a:gs>
+            <a:gs pos="100000">
+              <a:schemeClr val="phClr">
+                <a:tint val="50000"/>
+                <a:shade val="100000"/>
+                <a:satMod val="350000"/>
+              </a:schemeClr>
+            </a:gs>
+          </a:gsLst>
+          <a:lin ang="16200000" scaled="0"/>
+        </a:gradFill>
+      </a:fillStyleLst>
+      <a:lnStyleLst>
+        <a:ln w="9525" cap="flat" cmpd="sng" algn="ctr">
+          <a:solidFill>
+            <a:schemeClr val="phClr">
+              <a:shade val="95000"/>
+              <a:satMod val="105000"/>
+            </a:schemeClr>
+          </a:solidFill>
+          <a:prstDash val="solid"/>
+        </a:ln>
+        <a:ln w="25400" cap="flat" cmpd="sng" algn="ctr">
+          <a:solidFill>
+            <a:schemeClr val="phClr"/>
+          </a:solidFill>
+          <a:prstDash val="solid"/>
+        </a:ln>
+        <a:ln w="38100" cap="flat" cmpd="sng" algn="ctr">
+          <a:solidFill>
+            <a:schemeClr val="phClr"/>
+          </a:solidFill>
+          <a:prstDash val="solid"/>
+        </a:ln>
+      </a:lnStyleLst>
+      <a:effectStyleLst>
+        <a:effectStyle>
+          <a:effectLst>
+            <a:outerShdw blurRad="40000" dist="20000" dir="5400000" rotWithShape="0">
+              <a:srgbClr val="000000">
+                <a:alpha val="38000"/>
+              </a:srgbClr>
+            </a:outerShdw>
+          </a:effectLst>
+        </a:effectStyle>
+        <a:effectStyle>
+          <a:effectLst>
+            <a:outerShdw blurRad="40000" dist="23000" dir="5400000" rotWithShape="0">
+              <a:srgbClr val="000000">
+                <a:alpha val="35000"/>
+              </a:srgbClr>
+            </a:outerShdw>
+          </a:effectLst>
+        </a:effectStyle>
+        <a:effectStyle>
+          <a:effectLst>
+            <a:outerShdw blurRad="40000" dist="23000" dir="5400000" rotWithShape="0">
+              <a:srgbClr val="000000">
+                <a:alpha val="35000"/>
+              </a:srgbClr>
+            </a:outerShdw>
+          </a:effectLst>
+          <a:scene3d>
+            <a:camera prst="orthographicFront">
+              <a:rot lat="0" lon="0" rev="0"/>
+            </a:camera>
+            <a:lightRig rig="threePt" dir="t">
+              <a:rot lat="0" lon="0" rev="1200000"/>
+            </a:lightRig>
+          </a:scene3d>
+          <a:sp3d>
+            <a:bevelT w="63500" h="25400"/>
+          </a:sp3d>
+        </a:effectStyle>
+      </a:effectStyleLst>
+      <a:bgFillStyleLst>
+        <a:solidFill>
+          <a:schemeClr val="phClr"/>
+        </a:solidFill>
+        <a:gradFill rotWithShape="1">
+          <a:gsLst>
+            <a:gs pos="0">
+              <a:schemeClr val="phClr">
+                <a:tint val="40000"/>
+                <a:satMod val="350000"/>
+              </a:schemeClr>
+            </a:gs>
+            <a:gs pos="40000">
+              <a:schemeClr val="phClr">
+                <a:tint val="45000"/>
+                <a:shade val="99000"/>
+                <a:satMod val="350000"/>
+              </a:schemeClr>
+            </a:gs>
+            <a:gs pos="100000">
+              <a:schemeClr val="phClr">
+                <a:shade val="20000"/>
+                <a:satMod val="255000"/>
+              </a:schemeClr>
+            </a:gs>
+          </a:gsLst>
+          <a:path path="circle">
+            <a:fillToRect l="50000" t="-80000" r="50000" b="180000"/>
+          </a:path>
+        </a:gradFill>
+        <a:gradFill rotWithShape="1">
+          <a:gsLst>
+            <a:gs pos="0">
+              <a:schemeClr val="phClr">
+                <a:tint val="80000"/>
+                <a:satMod val="300000"/>
+              </a:schemeClr>
+            </a:gs>
+            <a:gs pos="100000">
+              <a:schemeClr val="phClr">
+                <a:shade val="30000"/>
+                <a:satMod val="200000"/>
+              </a:schemeClr>
+            </a:gs>
+          </a:gsLst>
+          <a:path path="circle">
+            <a:fillToRect l="50000" t="50000" r="50000" b="50000"/>
+          </a:path>
+        </a:gradFill>
+      </a:bgFillStyleLst>
+    </a:fmtScheme>
+  </a:themeElements>
+</a:theme>
+</file>
+
+<file path=ppt/theme/theme2.xml><?xml version="1.0" encoding="utf-8"?>
 <a:theme xmlns:a="http://schemas.openxmlformats.org/drawingml/2006/main" xmlns:r="http://schemas.openxmlformats.org/officeDocument/2006/relationships">
   <a:themeElements>
     <a:clrScheme name="Default">
@@ -15393,283 +15672,4 @@
     </a:fmtScheme>
   </a:themeElements>
 </a:theme>
-</file>
-
-<file path=ppt/theme/theme2.xml><?xml version="1.0" encoding="utf-8"?>
-<a:theme xmlns:a="http://schemas.openxmlformats.org/drawingml/2006/main" xmlns:r="http://schemas.openxmlformats.org/officeDocument/2006/relationships" name="Simple Light">
-  <a:themeElements>
-    <a:clrScheme name="Simple Light">
-      <a:dk1>
-        <a:srgbClr val="000000"/>
-      </a:dk1>
-      <a:lt1>
-        <a:srgbClr val="FFFFFF"/>
-      </a:lt1>
-      <a:dk2>
-        <a:srgbClr val="595959"/>
-      </a:dk2>
-      <a:lt2>
-        <a:srgbClr val="EEEEEE"/>
-      </a:lt2>
-      <a:accent1>
-        <a:srgbClr val="4285F4"/>
-      </a:accent1>
-      <a:accent2>
-        <a:srgbClr val="212121"/>
-      </a:accent2>
-      <a:accent3>
-        <a:srgbClr val="78909C"/>
-      </a:accent3>
-      <a:accent4>
-        <a:srgbClr val="FFAB40"/>
-      </a:accent4>
-      <a:accent5>
-        <a:srgbClr val="0097A7"/>
-      </a:accent5>
-      <a:accent6>
-        <a:srgbClr val="EEFF41"/>
-      </a:accent6>
-      <a:hlink>
-        <a:srgbClr val="0097A7"/>
-      </a:hlink>
-      <a:folHlink>
-        <a:srgbClr val="0097A7"/>
-      </a:folHlink>
-    </a:clrScheme>
-    <a:fontScheme name="Office">
-      <a:majorFont>
-        <a:latin typeface="Arial"/>
-        <a:ea typeface=""/>
-        <a:cs typeface=""/>
-        <a:font script="Jpan" typeface="ＭＳ Ｐゴシック"/>
-        <a:font script="Hang" typeface="맑은 고딕"/>
-        <a:font script="Hans" typeface="宋体"/>
-        <a:font script="Hant" typeface="新細明體"/>
-        <a:font script="Arab" typeface="Times New Roman"/>
-        <a:font script="Hebr" typeface="Times New Roman"/>
-        <a:font script="Thai" typeface="Angsana New"/>
-        <a:font script="Ethi" typeface="Nyala"/>
-        <a:font script="Beng" typeface="Vrinda"/>
-        <a:font script="Gujr" typeface="Shruti"/>
-        <a:font script="Khmr" typeface="MoolBoran"/>
-        <a:font script="Knda" typeface="Tunga"/>
-        <a:font script="Guru" typeface="Raavi"/>
-        <a:font script="Cans" typeface="Euphemia"/>
-        <a:font script="Cher" typeface="Plantagenet Cherokee"/>
-        <a:font script="Yiii" typeface="Microsoft Yi Baiti"/>
-        <a:font script="Tibt" typeface="Microsoft Himalaya"/>
-        <a:font script="Thaa" typeface="MV Boli"/>
-        <a:font script="Deva" typeface="Mangal"/>
-        <a:font script="Telu" typeface="Gautami"/>
-        <a:font script="Taml" typeface="Latha"/>
-        <a:font script="Syrc" typeface="Estrangelo Edessa"/>
-        <a:font script="Orya" typeface="Kalinga"/>
-        <a:font script="Mlym" typeface="Kartika"/>
-        <a:font script="Laoo" typeface="DokChampa"/>
-        <a:font script="Sinh" typeface="Iskoola Pota"/>
-        <a:font script="Mong" typeface="Mongolian Baiti"/>
-        <a:font script="Viet" typeface="Times New Roman"/>
-        <a:font script="Uigh" typeface="Microsoft Uighur"/>
-        <a:font script="Geor" typeface="Sylfaen"/>
-      </a:majorFont>
-      <a:minorFont>
-        <a:latin typeface="Arial"/>
-        <a:ea typeface=""/>
-        <a:cs typeface=""/>
-        <a:font script="Jpan" typeface="ＭＳ Ｐゴシック"/>
-        <a:font script="Hang" typeface="맑은 고딕"/>
-        <a:font script="Hans" typeface="宋体"/>
-        <a:font script="Hant" typeface="新細明體"/>
-        <a:font script="Arab" typeface="Arial"/>
-        <a:font script="Hebr" typeface="Arial"/>
-        <a:font script="Thai" typeface="Cordia New"/>
-        <a:font script="Ethi" typeface="Nyala"/>
-        <a:font script="Beng" typeface="Vrinda"/>
-        <a:font script="Gujr" typeface="Shruti"/>
-        <a:font script="Khmr" typeface="DaunPenh"/>
-        <a:font script="Knda" typeface="Tunga"/>
-        <a:font script="Guru" typeface="Raavi"/>
-        <a:font script="Cans" typeface="Euphemia"/>
-        <a:font script="Cher" typeface="Plantagenet Cherokee"/>
-        <a:font script="Yiii" typeface="Microsoft Yi Baiti"/>
-        <a:font script="Tibt" typeface="Microsoft Himalaya"/>
-        <a:font script="Thaa" typeface="MV Boli"/>
-        <a:font script="Deva" typeface="Mangal"/>
-        <a:font script="Telu" typeface="Gautami"/>
-        <a:font script="Taml" typeface="Latha"/>
-        <a:font script="Syrc" typeface="Estrangelo Edessa"/>
-        <a:font script="Orya" typeface="Kalinga"/>
-        <a:font script="Mlym" typeface="Kartika"/>
-        <a:font script="Laoo" typeface="DokChampa"/>
-        <a:font script="Sinh" typeface="Iskoola Pota"/>
-        <a:font script="Mong" typeface="Mongolian Baiti"/>
-        <a:font script="Viet" typeface="Arial"/>
-        <a:font script="Uigh" typeface="Microsoft Uighur"/>
-        <a:font script="Geor" typeface="Sylfaen"/>
-      </a:minorFont>
-    </a:fontScheme>
-    <a:fmtScheme name="Office">
-      <a:fillStyleLst>
-        <a:solidFill>
-          <a:schemeClr val="phClr"/>
-        </a:solidFill>
-        <a:gradFill rotWithShape="1">
-          <a:gsLst>
-            <a:gs pos="0">
-              <a:schemeClr val="phClr">
-                <a:tint val="50000"/>
-                <a:satMod val="300000"/>
-              </a:schemeClr>
-            </a:gs>
-            <a:gs pos="35000">
-              <a:schemeClr val="phClr">
-                <a:tint val="37000"/>
-                <a:satMod val="300000"/>
-              </a:schemeClr>
-            </a:gs>
-            <a:gs pos="100000">
-              <a:schemeClr val="phClr">
-                <a:tint val="15000"/>
-                <a:satMod val="350000"/>
-              </a:schemeClr>
-            </a:gs>
-          </a:gsLst>
-          <a:lin ang="16200000" scaled="1"/>
-        </a:gradFill>
-        <a:gradFill rotWithShape="1">
-          <a:gsLst>
-            <a:gs pos="0">
-              <a:schemeClr val="phClr">
-                <a:tint val="100000"/>
-                <a:shade val="100000"/>
-                <a:satMod val="130000"/>
-              </a:schemeClr>
-            </a:gs>
-            <a:gs pos="100000">
-              <a:schemeClr val="phClr">
-                <a:tint val="50000"/>
-                <a:shade val="100000"/>
-                <a:satMod val="350000"/>
-              </a:schemeClr>
-            </a:gs>
-          </a:gsLst>
-          <a:lin ang="16200000" scaled="0"/>
-        </a:gradFill>
-      </a:fillStyleLst>
-      <a:lnStyleLst>
-        <a:ln w="9525" cap="flat" cmpd="sng" algn="ctr">
-          <a:solidFill>
-            <a:schemeClr val="phClr">
-              <a:shade val="95000"/>
-              <a:satMod val="105000"/>
-            </a:schemeClr>
-          </a:solidFill>
-          <a:prstDash val="solid"/>
-        </a:ln>
-        <a:ln w="25400" cap="flat" cmpd="sng" algn="ctr">
-          <a:solidFill>
-            <a:schemeClr val="phClr"/>
-          </a:solidFill>
-          <a:prstDash val="solid"/>
-        </a:ln>
-        <a:ln w="38100" cap="flat" cmpd="sng" algn="ctr">
-          <a:solidFill>
-            <a:schemeClr val="phClr"/>
-          </a:solidFill>
-          <a:prstDash val="solid"/>
-        </a:ln>
-      </a:lnStyleLst>
-      <a:effectStyleLst>
-        <a:effectStyle>
-          <a:effectLst>
-            <a:outerShdw blurRad="40000" dist="20000" dir="5400000" rotWithShape="0">
-              <a:srgbClr val="000000">
-                <a:alpha val="38000"/>
-              </a:srgbClr>
-            </a:outerShdw>
-          </a:effectLst>
-        </a:effectStyle>
-        <a:effectStyle>
-          <a:effectLst>
-            <a:outerShdw blurRad="40000" dist="23000" dir="5400000" rotWithShape="0">
-              <a:srgbClr val="000000">
-                <a:alpha val="35000"/>
-              </a:srgbClr>
-            </a:outerShdw>
-          </a:effectLst>
-        </a:effectStyle>
-        <a:effectStyle>
-          <a:effectLst>
-            <a:outerShdw blurRad="40000" dist="23000" dir="5400000" rotWithShape="0">
-              <a:srgbClr val="000000">
-                <a:alpha val="35000"/>
-              </a:srgbClr>
-            </a:outerShdw>
-          </a:effectLst>
-          <a:scene3d>
-            <a:camera prst="orthographicFront">
-              <a:rot lat="0" lon="0" rev="0"/>
-            </a:camera>
-            <a:lightRig rig="threePt" dir="t">
-              <a:rot lat="0" lon="0" rev="1200000"/>
-            </a:lightRig>
-          </a:scene3d>
-          <a:sp3d>
-            <a:bevelT w="63500" h="25400"/>
-          </a:sp3d>
-        </a:effectStyle>
-      </a:effectStyleLst>
-      <a:bgFillStyleLst>
-        <a:solidFill>
-          <a:schemeClr val="phClr"/>
-        </a:solidFill>
-        <a:gradFill rotWithShape="1">
-          <a:gsLst>
-            <a:gs pos="0">
-              <a:schemeClr val="phClr">
-                <a:tint val="40000"/>
-                <a:satMod val="350000"/>
-              </a:schemeClr>
-            </a:gs>
-            <a:gs pos="40000">
-              <a:schemeClr val="phClr">
-                <a:tint val="45000"/>
-                <a:shade val="99000"/>
-                <a:satMod val="350000"/>
-              </a:schemeClr>
-            </a:gs>
-            <a:gs pos="100000">
-              <a:schemeClr val="phClr">
-                <a:shade val="20000"/>
-                <a:satMod val="255000"/>
-              </a:schemeClr>
-            </a:gs>
-          </a:gsLst>
-          <a:path path="circle">
-            <a:fillToRect l="50000" t="-80000" r="50000" b="180000"/>
-          </a:path>
-        </a:gradFill>
-        <a:gradFill rotWithShape="1">
-          <a:gsLst>
-            <a:gs pos="0">
-              <a:schemeClr val="phClr">
-                <a:tint val="80000"/>
-                <a:satMod val="300000"/>
-              </a:schemeClr>
-            </a:gs>
-            <a:gs pos="100000">
-              <a:schemeClr val="phClr">
-                <a:shade val="30000"/>
-                <a:satMod val="200000"/>
-              </a:schemeClr>
-            </a:gs>
-          </a:gsLst>
-          <a:path path="circle">
-            <a:fillToRect l="50000" t="50000" r="50000" b="50000"/>
-          </a:path>
-        </a:gradFill>
-      </a:bgFillStyleLst>
-    </a:fmtScheme>
-  </a:themeElements>
-</a:theme>
 </file>
</xml_diff>